<commit_message>
adds user class example
</commit_message>
<xml_diff>
--- a/HILT - Programming Concepts I.pptx
+++ b/HILT - Programming Concepts I.pptx
@@ -3669,7 +3669,11 @@
               </a:spcBef>
               <a:buNone/>
             </a:pPr>
-            <a:endParaRPr/>
+            <a:r>
+              <a:rPr lang="en-US" dirty="0" smtClean="0"/>
+              <a:t>Words generally are better. Someone reading your code should be able to tell what you’re talking about</a:t>
+            </a:r>
+            <a:endParaRPr dirty="0"/>
           </a:p>
         </p:txBody>
       </p:sp>
@@ -17434,11 +17438,7 @@
             </a:pPr>
             <a:r>
               <a:rPr lang="en-US" dirty="0" smtClean="0"/>
-              <a:t>When in </a:t>
-            </a:r>
-            <a:r>
-              <a:rPr lang="en-US" dirty="0" smtClean="0"/>
-              <a:t>IRB, terminal commands won’t work</a:t>
+              <a:t>When in IRB, terminal commands won’t work</a:t>
             </a:r>
             <a:endParaRPr lang="en" dirty="0"/>
           </a:p>

</xml_diff>